<commit_message>
Final PowerPoint, updated Completed Tasks, made wbs.png fully transparent
</commit_message>
<xml_diff>
--- a/Fit or Fail Technical Status Presentation (NEW).pptx
+++ b/Fit or Fail Technical Status Presentation (NEW).pptx
@@ -8,7 +8,7 @@
     <p:sldId id="256" r:id="rId2"/>
     <p:sldId id="272" r:id="rId3"/>
     <p:sldId id="258" r:id="rId4"/>
-    <p:sldId id="259" r:id="rId5"/>
+    <p:sldId id="276" r:id="rId5"/>
     <p:sldId id="257" r:id="rId6"/>
     <p:sldId id="270" r:id="rId7"/>
     <p:sldId id="271" r:id="rId8"/>
@@ -18,7 +18,7 @@
     <p:sldId id="266" r:id="rId12"/>
     <p:sldId id="267" r:id="rId13"/>
     <p:sldId id="273" r:id="rId14"/>
-    <p:sldId id="274" r:id="rId15"/>
+    <p:sldId id="277" r:id="rId15"/>
   </p:sldIdLst>
   <p:sldSz cx="12192000" cy="6858000"/>
   <p:notesSz cx="6858000" cy="9144000"/>
@@ -3838,13 +3838,6 @@
             <a:pPr algn="ctr"/>
             <a:r>
               <a:rPr lang="en-US" dirty="0" smtClean="0"/>
-              <a:t>Deliverables:</a:t>
-            </a:r>
-            <a:br>
-              <a:rPr lang="en-US" dirty="0" smtClean="0"/>
-            </a:br>
-            <a:r>
-              <a:rPr lang="en-US" dirty="0" smtClean="0"/>
               <a:t>Work </a:t>
             </a:r>
             <a:r>
@@ -3856,28 +3849,28 @@
       </p:sp>
       <p:pic>
         <p:nvPicPr>
-          <p:cNvPr id="4" name="Picture 3">
-            <a:extLst>
-              <a:ext uri="{FF2B5EF4-FFF2-40B4-BE49-F238E27FC236}">
-                <a16:creationId xmlns:a16="http://schemas.microsoft.com/office/drawing/2014/main" id="{120B2870-4A2D-4727-AA23-FEE4E1E2BAD3}"/>
-              </a:ext>
-            </a:extLst>
-          </p:cNvPr>
+          <p:cNvPr id="5" name="Picture 4"/>
           <p:cNvPicPr>
             <a:picLocks noChangeAspect="1"/>
           </p:cNvPicPr>
           <p:nvPr/>
         </p:nvPicPr>
         <p:blipFill>
-          <a:blip r:embed="rId2"/>
+          <a:blip r:embed="rId2">
+            <a:extLst>
+              <a:ext uri="{28A0092B-C50C-407E-A947-70E740481C1C}">
+                <a14:useLocalDpi xmlns:a14="http://schemas.microsoft.com/office/drawing/2010/main" val="0"/>
+              </a:ext>
+            </a:extLst>
+          </a:blip>
           <a:stretch>
             <a:fillRect/>
           </a:stretch>
         </p:blipFill>
         <p:spPr>
           <a:xfrm>
-            <a:off x="712986" y="2555294"/>
-            <a:ext cx="10766028" cy="3693105"/>
+            <a:off x="1185916" y="1628636"/>
+            <a:ext cx="10134600" cy="4420410"/>
           </a:xfrm>
           <a:prstGeom prst="rect">
             <a:avLst/>
@@ -4022,7 +4015,18 @@
             <a:pPr algn="ctr"/>
             <a:r>
               <a:rPr lang="en-US" dirty="0" smtClean="0"/>
-              <a:t>Project Review: II</a:t>
+              <a:t>Project Review: </a:t>
+            </a:r>
+            <a:r>
+              <a:rPr lang="en-US" dirty="0" smtClean="0"/>
+              <a:t>II</a:t>
+            </a:r>
+            <a:br>
+              <a:rPr lang="en-US" dirty="0" smtClean="0"/>
+            </a:br>
+            <a:r>
+              <a:rPr lang="en-US" dirty="0" smtClean="0"/>
+              <a:t>(Project Review: III Coming Soon)</a:t>
             </a:r>
             <a:endParaRPr lang="en-US" dirty="0"/>
           </a:p>
@@ -4210,6 +4214,66 @@
           </a:p>
         </p:txBody>
       </p:sp>
+      <p:pic>
+        <p:nvPicPr>
+          <p:cNvPr id="5" name="Picture 4"/>
+          <p:cNvPicPr>
+            <a:picLocks noChangeAspect="1"/>
+          </p:cNvPicPr>
+          <p:nvPr/>
+        </p:nvPicPr>
+        <p:blipFill>
+          <a:blip r:embed="rId2" cstate="hqprint">
+            <a:extLst>
+              <a:ext uri="{28A0092B-C50C-407E-A947-70E740481C1C}">
+                <a14:useLocalDpi xmlns:a14="http://schemas.microsoft.com/office/drawing/2010/main" val="0"/>
+              </a:ext>
+            </a:extLst>
+          </a:blip>
+          <a:stretch>
+            <a:fillRect/>
+          </a:stretch>
+        </p:blipFill>
+        <p:spPr>
+          <a:xfrm>
+            <a:off x="8387861" y="1853754"/>
+            <a:ext cx="2859435" cy="2020667"/>
+          </a:xfrm>
+          <a:prstGeom prst="rect">
+            <a:avLst/>
+          </a:prstGeom>
+        </p:spPr>
+      </p:pic>
+      <p:pic>
+        <p:nvPicPr>
+          <p:cNvPr id="6" name="Picture 5"/>
+          <p:cNvPicPr>
+            <a:picLocks noChangeAspect="1"/>
+          </p:cNvPicPr>
+          <p:nvPr/>
+        </p:nvPicPr>
+        <p:blipFill>
+          <a:blip r:embed="rId3">
+            <a:extLst>
+              <a:ext uri="{28A0092B-C50C-407E-A947-70E740481C1C}">
+                <a14:useLocalDpi xmlns:a14="http://schemas.microsoft.com/office/drawing/2010/main" val="0"/>
+              </a:ext>
+            </a:extLst>
+          </a:blip>
+          <a:stretch>
+            <a:fillRect/>
+          </a:stretch>
+        </p:blipFill>
+        <p:spPr>
+          <a:xfrm>
+            <a:off x="6594758" y="3581399"/>
+            <a:ext cx="1793103" cy="2321169"/>
+          </a:xfrm>
+          <a:prstGeom prst="rect">
+            <a:avLst/>
+          </a:prstGeom>
+        </p:spPr>
+      </p:pic>
     </p:spTree>
     <p:extLst>
       <p:ext uri="{BB962C8B-B14F-4D97-AF65-F5344CB8AC3E}">
@@ -4257,111 +4321,163 @@
           <a:p>
             <a:pPr algn="ctr"/>
             <a:r>
-              <a:rPr lang="en-US" dirty="0" smtClean="0"/>
+              <a:rPr lang="en-US" dirty="0"/>
               <a:t>Our To-do List</a:t>
             </a:r>
+          </a:p>
+        </p:txBody>
+      </p:sp>
+      <p:sp>
+        <p:nvSpPr>
+          <p:cNvPr id="3" name="Content Placeholder 2"/>
+          <p:cNvSpPr>
+            <a:spLocks noGrp="1"/>
+          </p:cNvSpPr>
+          <p:nvPr>
+            <p:ph sz="half" idx="1"/>
+          </p:nvPr>
+        </p:nvSpPr>
+        <p:spPr/>
+        <p:txBody>
+          <a:bodyPr>
+            <a:normAutofit fontScale="62500" lnSpcReduction="20000"/>
+          </a:bodyPr>
+          <a:lstStyle/>
+          <a:p>
+            <a:r>
+              <a:rPr lang="en-US" dirty="0"/>
+              <a:t>Create working frontend prototype, working incrementally</a:t>
+            </a:r>
+          </a:p>
+          <a:p>
+            <a:pPr lvl="1"/>
+            <a:r>
+              <a:rPr lang="en-US" dirty="0"/>
+              <a:t>Login/Register page</a:t>
+            </a:r>
+          </a:p>
+          <a:p>
+            <a:pPr lvl="2"/>
+            <a:r>
+              <a:rPr lang="en-US" dirty="0"/>
+              <a:t>Connect to backend</a:t>
+            </a:r>
+          </a:p>
+          <a:p>
+            <a:pPr lvl="1"/>
+            <a:r>
+              <a:rPr lang="en-US" dirty="0"/>
+              <a:t>Game</a:t>
+            </a:r>
+          </a:p>
+          <a:p>
+            <a:pPr lvl="2"/>
+            <a:r>
+              <a:rPr lang="en-US" dirty="0"/>
+              <a:t>Local</a:t>
+            </a:r>
+          </a:p>
+          <a:p>
+            <a:pPr lvl="2"/>
+            <a:r>
+              <a:rPr lang="en-US" dirty="0"/>
+              <a:t>Online</a:t>
+            </a:r>
+          </a:p>
+          <a:p>
+            <a:pPr lvl="1"/>
+            <a:r>
+              <a:rPr lang="en-US" dirty="0"/>
+              <a:t>Advertising</a:t>
+            </a:r>
+          </a:p>
+          <a:p>
+            <a:pPr lvl="1"/>
+            <a:r>
+              <a:rPr lang="en-US" dirty="0"/>
+              <a:t>User pages</a:t>
+            </a:r>
+          </a:p>
+          <a:p>
+            <a:pPr lvl="1"/>
+            <a:r>
+              <a:rPr lang="en-US" dirty="0"/>
+              <a:t>Team pages</a:t>
+            </a:r>
+          </a:p>
+          <a:p>
+            <a:pPr lvl="1"/>
+            <a:r>
+              <a:rPr lang="en-US" dirty="0"/>
+              <a:t>Public leaderboards</a:t>
+            </a:r>
+          </a:p>
+          <a:p>
+            <a:r>
+              <a:rPr lang="en-US" dirty="0" smtClean="0"/>
+              <a:t>Expand </a:t>
+            </a:r>
+            <a:r>
+              <a:rPr lang="en-US" dirty="0"/>
+              <a:t>upon backend functionality</a:t>
+            </a:r>
+          </a:p>
+          <a:p>
+            <a:pPr lvl="1"/>
+            <a:r>
+              <a:rPr lang="en-US" dirty="0"/>
+              <a:t>Donations</a:t>
+            </a:r>
+          </a:p>
+          <a:p>
+            <a:pPr lvl="1"/>
+            <a:r>
+              <a:rPr lang="en-US" dirty="0"/>
+              <a:t>Monitoring</a:t>
+            </a:r>
+          </a:p>
+          <a:p>
+            <a:pPr lvl="1"/>
+            <a:r>
+              <a:rPr lang="en-US" dirty="0"/>
+              <a:t>Everything else as </a:t>
+            </a:r>
+            <a:r>
+              <a:rPr lang="en-US" dirty="0" smtClean="0"/>
+              <a:t>needed</a:t>
+            </a:r>
             <a:endParaRPr lang="en-US" dirty="0"/>
           </a:p>
-        </p:txBody>
-      </p:sp>
-      <p:sp>
-        <p:nvSpPr>
-          <p:cNvPr id="3" name="Content Placeholder 2"/>
-          <p:cNvSpPr>
-            <a:spLocks noGrp="1"/>
-          </p:cNvSpPr>
-          <p:nvPr>
-            <p:ph idx="1"/>
+          <a:p>
+            <a:endParaRPr lang="en-US" dirty="0"/>
+          </a:p>
+        </p:txBody>
+      </p:sp>
+      <p:sp>
+        <p:nvSpPr>
+          <p:cNvPr id="4" name="Content Placeholder 3"/>
+          <p:cNvSpPr>
+            <a:spLocks noGrp="1"/>
+          </p:cNvSpPr>
+          <p:nvPr>
+            <p:ph sz="half" idx="2"/>
           </p:nvPr>
         </p:nvSpPr>
         <p:spPr/>
         <p:txBody>
           <a:bodyPr>
-            <a:normAutofit fontScale="70000" lnSpcReduction="20000"/>
+            <a:normAutofit fontScale="62500" lnSpcReduction="20000"/>
           </a:bodyPr>
           <a:lstStyle/>
           <a:p>
             <a:r>
-              <a:rPr lang="en-US" dirty="0" smtClean="0"/>
-              <a:t>Create working frontend prototype, working incrementally</a:t>
-            </a:r>
-          </a:p>
-          <a:p>
-            <a:pPr lvl="1"/>
-            <a:r>
-              <a:rPr lang="en-US" dirty="0" smtClean="0"/>
-              <a:t>Login/Register page</a:t>
-            </a:r>
-          </a:p>
-          <a:p>
-            <a:pPr lvl="2"/>
-            <a:r>
-              <a:rPr lang="en-US" dirty="0" smtClean="0"/>
-              <a:t>Connect to backend</a:t>
-            </a:r>
-          </a:p>
-          <a:p>
-            <a:pPr lvl="1"/>
-            <a:r>
-              <a:rPr lang="en-US" dirty="0" smtClean="0"/>
-              <a:t>Game</a:t>
-            </a:r>
-          </a:p>
-          <a:p>
-            <a:pPr lvl="2"/>
-            <a:r>
-              <a:rPr lang="en-US" dirty="0" smtClean="0"/>
-              <a:t>Local</a:t>
-            </a:r>
-          </a:p>
-          <a:p>
-            <a:pPr lvl="2"/>
-            <a:r>
-              <a:rPr lang="en-US" dirty="0" smtClean="0"/>
-              <a:t>Online</a:t>
-            </a:r>
-          </a:p>
-          <a:p>
-            <a:pPr lvl="1"/>
-            <a:r>
-              <a:rPr lang="en-US" dirty="0" smtClean="0"/>
-              <a:t>User pages</a:t>
-            </a:r>
-          </a:p>
-          <a:p>
-            <a:pPr lvl="1"/>
-            <a:r>
-              <a:rPr lang="en-US" dirty="0" smtClean="0"/>
-              <a:t>Team pages</a:t>
-            </a:r>
-          </a:p>
-          <a:p>
-            <a:pPr lvl="1"/>
-            <a:r>
-              <a:rPr lang="en-US" dirty="0" smtClean="0"/>
-              <a:t>Public leaderboards</a:t>
-            </a:r>
-          </a:p>
-          <a:p>
-            <a:r>
-              <a:rPr lang="en-US" dirty="0" smtClean="0"/>
-              <a:t>Acquire hosting, make </a:t>
-            </a:r>
-            <a:r>
-              <a:rPr lang="en-US" smtClean="0"/>
-              <a:t>the project live</a:t>
-            </a:r>
-            <a:endParaRPr lang="en-US" dirty="0" smtClean="0"/>
-          </a:p>
-          <a:p>
-            <a:r>
-              <a:rPr lang="en-US" dirty="0" smtClean="0"/>
-              <a:t>Expand upon backend functionality as needed</a:t>
-            </a:r>
-          </a:p>
-          <a:p>
-            <a:r>
-              <a:rPr lang="en-US" dirty="0" smtClean="0"/>
+              <a:rPr lang="en-US" dirty="0"/>
+              <a:t>Acquire hosting, have it be live</a:t>
+            </a:r>
+          </a:p>
+          <a:p>
+            <a:r>
+              <a:rPr lang="en-US" dirty="0"/>
               <a:t>Expand upon testing skeleton</a:t>
             </a:r>
           </a:p>
@@ -4373,7 +4489,7 @@
     </p:spTree>
     <p:extLst>
       <p:ext uri="{BB962C8B-B14F-4D97-AF65-F5344CB8AC3E}">
-        <p14:creationId xmlns:p14="http://schemas.microsoft.com/office/powerpoint/2010/main" val="39022633"/>
+        <p14:creationId xmlns:p14="http://schemas.microsoft.com/office/powerpoint/2010/main" val="2579503228"/>
       </p:ext>
     </p:extLst>
   </p:cSld>
@@ -4480,7 +4596,7 @@
       </p:sp>
       <p:pic>
         <p:nvPicPr>
-          <p:cNvPr id="4" name="Picture 3"/>
+          <p:cNvPr id="5" name="Picture 4"/>
           <p:cNvPicPr>
             <a:picLocks noChangeAspect="1"/>
           </p:cNvPicPr>
@@ -4720,13 +4836,7 @@
       </p:grpSpPr>
       <p:sp>
         <p:nvSpPr>
-          <p:cNvPr id="2" name="Title 1">
-            <a:extLst>
-              <a:ext uri="{FF2B5EF4-FFF2-40B4-BE49-F238E27FC236}">
-                <a16:creationId xmlns:a16="http://schemas.microsoft.com/office/drawing/2014/main" id="{2CA9E641-81A2-44B5-B4CB-6723E8C21FE0}"/>
-              </a:ext>
-            </a:extLst>
-          </p:cNvPr>
+          <p:cNvPr id="2" name="Title 1"/>
           <p:cNvSpPr>
             <a:spLocks noGrp="1"/>
           </p:cNvSpPr>
@@ -4741,188 +4851,198 @@
           <a:p>
             <a:pPr algn="ctr"/>
             <a:r>
-              <a:rPr lang="en-US" dirty="0" smtClean="0"/>
-              <a:t>Technologies </a:t>
-            </a:r>
-            <a:r>
-              <a:rPr lang="en-US" dirty="0"/>
-              <a:t>Used</a:t>
-            </a:r>
-          </a:p>
-        </p:txBody>
-      </p:sp>
-      <p:sp>
-        <p:nvSpPr>
-          <p:cNvPr id="3" name="TextBox 2">
-            <a:extLst>
-              <a:ext uri="{FF2B5EF4-FFF2-40B4-BE49-F238E27FC236}">
-                <a16:creationId xmlns:a16="http://schemas.microsoft.com/office/drawing/2014/main" id="{39819AF1-0C22-47B7-86F3-30C130EF3798}"/>
-              </a:ext>
-            </a:extLst>
-          </p:cNvPr>
-          <p:cNvSpPr txBox="1"/>
-          <p:nvPr/>
-        </p:nvSpPr>
-        <p:spPr>
-          <a:xfrm>
-            <a:off x="1085850" y="1943100"/>
-            <a:ext cx="9972675" cy="3416320"/>
-          </a:xfrm>
-          <a:prstGeom prst="rect">
-            <a:avLst/>
-          </a:prstGeom>
-          <a:noFill/>
-        </p:spPr>
-        <p:txBody>
-          <a:bodyPr wrap="square" rtlCol="0">
-            <a:spAutoFit/>
+              <a:rPr lang="en-US" dirty="0"/>
+              <a:t>Technologies Used</a:t>
+            </a:r>
+          </a:p>
+        </p:txBody>
+      </p:sp>
+      <p:sp>
+        <p:nvSpPr>
+          <p:cNvPr id="3" name="Content Placeholder 2"/>
+          <p:cNvSpPr>
+            <a:spLocks noGrp="1"/>
+          </p:cNvSpPr>
+          <p:nvPr>
+            <p:ph sz="half" idx="1"/>
+          </p:nvPr>
+        </p:nvSpPr>
+        <p:spPr/>
+        <p:txBody>
+          <a:bodyPr>
+            <a:normAutofit fontScale="77500" lnSpcReduction="20000"/>
           </a:bodyPr>
           <a:lstStyle/>
           <a:p>
-            <a:pPr marL="285750" indent="-285750">
-              <a:buFont typeface="Arial" panose="020B0604020202020204" pitchFamily="34" charset="0"/>
-              <a:buChar char="•"/>
-            </a:pPr>
-            <a:r>
-              <a:rPr lang="en-US" dirty="0" smtClean="0"/>
+            <a:pPr marL="285750" indent="-285750"/>
+            <a:r>
+              <a:rPr lang="en-US" dirty="0"/>
               <a:t>Front end:</a:t>
             </a:r>
+          </a:p>
+          <a:p>
+            <a:pPr marL="742950" lvl="1" indent="-285750"/>
+            <a:r>
+              <a:rPr lang="en-US" dirty="0"/>
+              <a:t>HTML/CSS</a:t>
+            </a:r>
+          </a:p>
+          <a:p>
+            <a:pPr marL="742950" lvl="1" indent="-285750"/>
+            <a:r>
+              <a:rPr lang="en-US" dirty="0"/>
+              <a:t>JavaScript</a:t>
+            </a:r>
+          </a:p>
+          <a:p>
+            <a:pPr marL="1200150" lvl="2" indent="-285750"/>
+            <a:r>
+              <a:rPr lang="en-US" dirty="0"/>
+              <a:t>React</a:t>
+            </a:r>
+          </a:p>
+          <a:p>
+            <a:pPr marL="1200150" lvl="2" indent="-285750"/>
+            <a:r>
+              <a:rPr lang="en-US" dirty="0"/>
+              <a:t>Bootstrap (possibly)</a:t>
+            </a:r>
+          </a:p>
+          <a:p>
+            <a:pPr marL="285750" indent="-285750"/>
+            <a:r>
+              <a:rPr lang="en-US" dirty="0"/>
+              <a:t>Back end</a:t>
+            </a:r>
+          </a:p>
+          <a:p>
+            <a:pPr marL="742950" lvl="1" indent="-285750"/>
+            <a:r>
+              <a:rPr lang="en-US" dirty="0"/>
+              <a:t>MongoDB</a:t>
+            </a:r>
+          </a:p>
+          <a:p>
+            <a:pPr marL="742950" lvl="1" indent="-285750"/>
+            <a:r>
+              <a:rPr lang="en-US" dirty="0"/>
+              <a:t>JavaScript</a:t>
+            </a:r>
+          </a:p>
+          <a:p>
+            <a:pPr marL="1200150" lvl="2" indent="-285750"/>
+            <a:r>
+              <a:rPr lang="en-US" dirty="0"/>
+              <a:t>Express.js</a:t>
+            </a:r>
+          </a:p>
+          <a:p>
+            <a:pPr marL="1200150" lvl="2" indent="-285750"/>
+            <a:r>
+              <a:rPr lang="en-US" dirty="0"/>
+              <a:t>JSON Web Tokens</a:t>
+            </a:r>
+          </a:p>
+          <a:p>
+            <a:pPr marL="285750" indent="-285750"/>
+            <a:r>
+              <a:rPr lang="en-US" dirty="0"/>
+              <a:t>Domain/Hosting provider</a:t>
+            </a:r>
+          </a:p>
+          <a:p>
+            <a:pPr marL="742950" lvl="1" indent="-285750"/>
+            <a:r>
+              <a:rPr lang="en-US" dirty="0"/>
+              <a:t>name.com (GitHub student developer pack)</a:t>
+            </a:r>
+          </a:p>
+        </p:txBody>
+      </p:sp>
+      <p:sp>
+        <p:nvSpPr>
+          <p:cNvPr id="4" name="Content Placeholder 3"/>
+          <p:cNvSpPr>
+            <a:spLocks noGrp="1"/>
+          </p:cNvSpPr>
+          <p:nvPr>
+            <p:ph sz="half" idx="2"/>
+          </p:nvPr>
+        </p:nvSpPr>
+        <p:spPr/>
+        <p:txBody>
+          <a:bodyPr>
+            <a:normAutofit fontScale="77500" lnSpcReduction="20000"/>
+          </a:bodyPr>
+          <a:lstStyle/>
+          <a:p>
+            <a:r>
+              <a:rPr lang="en-US" dirty="0" smtClean="0"/>
+              <a:t>Collaboration:</a:t>
+            </a:r>
+          </a:p>
+          <a:p>
+            <a:pPr lvl="1"/>
+            <a:r>
+              <a:rPr lang="en-US" dirty="0" smtClean="0"/>
+              <a:t>GitHub/</a:t>
+            </a:r>
+            <a:r>
+              <a:rPr lang="en-US" dirty="0" err="1" smtClean="0"/>
+              <a:t>Git</a:t>
+            </a:r>
+            <a:endParaRPr lang="en-US" dirty="0" smtClean="0"/>
+          </a:p>
+          <a:p>
+            <a:pPr lvl="1"/>
+            <a:r>
+              <a:rPr lang="en-US" dirty="0" err="1" smtClean="0"/>
+              <a:t>GroupMe</a:t>
+            </a:r>
+            <a:endParaRPr lang="en-US" dirty="0" smtClean="0"/>
+          </a:p>
+          <a:p>
+            <a:pPr lvl="1"/>
+            <a:r>
+              <a:rPr lang="en-US" dirty="0" smtClean="0"/>
+              <a:t>Google Hangouts</a:t>
+            </a:r>
+          </a:p>
+          <a:p>
+            <a:r>
+              <a:rPr lang="en-US" dirty="0" smtClean="0"/>
+              <a:t>Miscellaneous</a:t>
+            </a:r>
+          </a:p>
+          <a:p>
+            <a:pPr lvl="1"/>
+            <a:r>
+              <a:rPr lang="en-US" dirty="0" smtClean="0"/>
+              <a:t>Various </a:t>
+            </a:r>
+            <a:r>
+              <a:rPr lang="en-US" dirty="0" err="1" smtClean="0"/>
+              <a:t>npm</a:t>
+            </a:r>
+            <a:r>
+              <a:rPr lang="en-US" dirty="0" smtClean="0"/>
+              <a:t> packages</a:t>
+            </a:r>
+          </a:p>
+          <a:p>
+            <a:pPr lvl="1"/>
+            <a:r>
+              <a:rPr lang="en-US" dirty="0" smtClean="0"/>
+              <a:t>Postman to make HTML requests for backend testing</a:t>
+            </a:r>
             <a:endParaRPr lang="en-US" dirty="0"/>
-          </a:p>
-          <a:p>
-            <a:pPr marL="742950" lvl="1" indent="-285750">
-              <a:buFont typeface="Arial" panose="020B0604020202020204" pitchFamily="34" charset="0"/>
-              <a:buChar char="•"/>
-            </a:pPr>
-            <a:r>
-              <a:rPr lang="en-US" dirty="0" smtClean="0"/>
-              <a:t>HTML/CSS</a:t>
-            </a:r>
-          </a:p>
-          <a:p>
-            <a:pPr marL="742950" lvl="1" indent="-285750">
-              <a:buFont typeface="Arial" panose="020B0604020202020204" pitchFamily="34" charset="0"/>
-              <a:buChar char="•"/>
-            </a:pPr>
-            <a:r>
-              <a:rPr lang="en-US" dirty="0" smtClean="0"/>
-              <a:t>JavaScript</a:t>
-            </a:r>
-          </a:p>
-          <a:p>
-            <a:pPr marL="1200150" lvl="2" indent="-285750">
-              <a:buFont typeface="Arial" panose="020B0604020202020204" pitchFamily="34" charset="0"/>
-              <a:buChar char="•"/>
-            </a:pPr>
-            <a:r>
-              <a:rPr lang="en-US" dirty="0" smtClean="0"/>
-              <a:t>React</a:t>
-            </a:r>
-          </a:p>
-          <a:p>
-            <a:pPr marL="1200150" lvl="2" indent="-285750">
-              <a:buFont typeface="Arial" panose="020B0604020202020204" pitchFamily="34" charset="0"/>
-              <a:buChar char="•"/>
-            </a:pPr>
-            <a:r>
-              <a:rPr lang="en-US" dirty="0" smtClean="0"/>
-              <a:t>Bootstrap (possibly)</a:t>
-            </a:r>
-            <a:endParaRPr lang="en-US" dirty="0"/>
-          </a:p>
-          <a:p>
-            <a:pPr marL="285750" indent="-285750">
-              <a:buFont typeface="Arial" panose="020B0604020202020204" pitchFamily="34" charset="0"/>
-              <a:buChar char="•"/>
-            </a:pPr>
-            <a:r>
-              <a:rPr lang="en-US" dirty="0" smtClean="0"/>
-              <a:t>Back </a:t>
-            </a:r>
-            <a:r>
-              <a:rPr lang="en-US" dirty="0" smtClean="0"/>
-              <a:t>end</a:t>
-            </a:r>
-            <a:endParaRPr lang="en-US" dirty="0"/>
-          </a:p>
-          <a:p>
-            <a:pPr marL="742950" lvl="1" indent="-285750">
-              <a:buFont typeface="Arial" panose="020B0604020202020204" pitchFamily="34" charset="0"/>
-              <a:buChar char="•"/>
-            </a:pPr>
-            <a:r>
-              <a:rPr lang="en-US" dirty="0" smtClean="0"/>
-              <a:t>MongoDB</a:t>
-            </a:r>
-          </a:p>
-          <a:p>
-            <a:pPr marL="742950" lvl="1" indent="-285750">
-              <a:buFont typeface="Arial" panose="020B0604020202020204" pitchFamily="34" charset="0"/>
-              <a:buChar char="•"/>
-            </a:pPr>
-            <a:r>
-              <a:rPr lang="en-US" dirty="0" smtClean="0"/>
-              <a:t>JavaScript</a:t>
-            </a:r>
-            <a:endParaRPr lang="en-US" dirty="0" smtClean="0"/>
-          </a:p>
-          <a:p>
-            <a:pPr marL="1200150" lvl="2" indent="-285750">
-              <a:buFont typeface="Arial" panose="020B0604020202020204" pitchFamily="34" charset="0"/>
-              <a:buChar char="•"/>
-            </a:pPr>
-            <a:r>
-              <a:rPr lang="en-US" dirty="0" smtClean="0"/>
-              <a:t>Express.js</a:t>
-            </a:r>
-          </a:p>
-          <a:p>
-            <a:pPr marL="1200150" lvl="2" indent="-285750">
-              <a:buFont typeface="Arial" panose="020B0604020202020204" pitchFamily="34" charset="0"/>
-              <a:buChar char="•"/>
-            </a:pPr>
-            <a:r>
-              <a:rPr lang="en-US" dirty="0" smtClean="0"/>
-              <a:t>JSON </a:t>
-            </a:r>
-            <a:r>
-              <a:rPr lang="en-US" dirty="0" smtClean="0"/>
-              <a:t>Web </a:t>
-            </a:r>
-            <a:r>
-              <a:rPr lang="en-US" dirty="0" smtClean="0"/>
-              <a:t>Tokens</a:t>
-            </a:r>
-            <a:endParaRPr lang="en-US" dirty="0"/>
-          </a:p>
-          <a:p>
-            <a:pPr marL="285750" indent="-285750">
-              <a:buFont typeface="Arial" panose="020B0604020202020204" pitchFamily="34" charset="0"/>
-              <a:buChar char="•"/>
-            </a:pPr>
-            <a:r>
-              <a:rPr lang="en-US" dirty="0" smtClean="0"/>
-              <a:t>Domain/Hosting provider</a:t>
-            </a:r>
-            <a:endParaRPr lang="en-US" dirty="0"/>
-          </a:p>
-          <a:p>
-            <a:pPr marL="742950" lvl="1" indent="-285750">
-              <a:buFont typeface="Arial" panose="020B0604020202020204" pitchFamily="34" charset="0"/>
-              <a:buChar char="•"/>
-            </a:pPr>
-            <a:r>
-              <a:rPr lang="en-US" dirty="0" smtClean="0"/>
-              <a:t>name.com (GitHub student developer pack)</a:t>
-            </a:r>
-            <a:endParaRPr lang="en-US" dirty="0" smtClean="0"/>
           </a:p>
         </p:txBody>
       </p:sp>
     </p:spTree>
     <p:extLst>
       <p:ext uri="{BB962C8B-B14F-4D97-AF65-F5344CB8AC3E}">
-        <p14:creationId xmlns:p14="http://schemas.microsoft.com/office/powerpoint/2010/main" val="940705121"/>
+        <p14:creationId xmlns:p14="http://schemas.microsoft.com/office/powerpoint/2010/main" val="2610944261"/>
       </p:ext>
     </p:extLst>
   </p:cSld>
@@ -5148,6 +5268,36 @@
           </a:p>
         </p:txBody>
       </p:sp>
+      <p:pic>
+        <p:nvPicPr>
+          <p:cNvPr id="4" name="Picture 3"/>
+          <p:cNvPicPr>
+            <a:picLocks noChangeAspect="1"/>
+          </p:cNvPicPr>
+          <p:nvPr/>
+        </p:nvPicPr>
+        <p:blipFill>
+          <a:blip r:embed="rId2" cstate="hqprint">
+            <a:extLst>
+              <a:ext uri="{28A0092B-C50C-407E-A947-70E740481C1C}">
+                <a14:useLocalDpi xmlns:a14="http://schemas.microsoft.com/office/drawing/2010/main" val="0"/>
+              </a:ext>
+            </a:extLst>
+          </a:blip>
+          <a:stretch>
+            <a:fillRect/>
+          </a:stretch>
+        </p:blipFill>
+        <p:spPr>
+          <a:xfrm>
+            <a:off x="9056078" y="3999554"/>
+            <a:ext cx="2975856" cy="1674415"/>
+          </a:xfrm>
+          <a:prstGeom prst="rect">
+            <a:avLst/>
+          </a:prstGeom>
+        </p:spPr>
+      </p:pic>
     </p:spTree>
     <p:extLst>
       <p:ext uri="{BB962C8B-B14F-4D97-AF65-F5344CB8AC3E}">
@@ -5467,13 +5617,6 @@
           <a:lstStyle/>
           <a:p>
             <a:pPr algn="ctr"/>
-            <a:r>
-              <a:rPr lang="en-US" dirty="0" smtClean="0"/>
-              <a:t>Deliverables:</a:t>
-            </a:r>
-            <a:br>
-              <a:rPr lang="en-US" dirty="0" smtClean="0"/>
-            </a:br>
             <a:r>
               <a:rPr lang="en-US" dirty="0" smtClean="0"/>
               <a:t>Website </a:t>
@@ -5588,13 +5731,6 @@
           <a:lstStyle/>
           <a:p>
             <a:pPr algn="ctr"/>
-            <a:r>
-              <a:rPr lang="en-US" dirty="0" smtClean="0"/>
-              <a:t>Deliverables:</a:t>
-            </a:r>
-            <a:br>
-              <a:rPr lang="en-US" dirty="0" smtClean="0"/>
-            </a:br>
             <a:r>
               <a:rPr lang="en-US" dirty="0" smtClean="0"/>
               <a:t>Process </a:t>

</xml_diff>